<commit_message>
This is the presentation file uploaded by gitbash
</commit_message>
<xml_diff>
--- a/PPT_School_App.pptx
+++ b/PPT_School_App.pptx
@@ -5,7 +5,7 @@
     <p:sldMasterId id="2147483712" r:id="rId1"/>
   </p:sldMasterIdLst>
   <p:notesMasterIdLst>
-    <p:notesMasterId r:id="rId19"/>
+    <p:notesMasterId r:id="rId21"/>
   </p:notesMasterIdLst>
   <p:sldIdLst>
     <p:sldId id="256" r:id="rId2"/>
@@ -24,7 +24,9 @@
     <p:sldId id="268" r:id="rId15"/>
     <p:sldId id="269" r:id="rId16"/>
     <p:sldId id="261" r:id="rId17"/>
-    <p:sldId id="265" r:id="rId18"/>
+    <p:sldId id="278" r:id="rId18"/>
+    <p:sldId id="265" r:id="rId19"/>
+    <p:sldId id="279" r:id="rId20"/>
   </p:sldIdLst>
   <p:sldSz cx="9144000" cy="6858000" type="screen4x3"/>
   <p:notesSz cx="6858000" cy="9144000"/>
@@ -6992,12 +6994,12 @@
   </p:clrMapOvr>
   <mc:AlternateContent xmlns:mc="http://schemas.openxmlformats.org/markup-compatibility/2006" xmlns:p14="http://schemas.microsoft.com/office/powerpoint/2010/main">
     <mc:Choice Requires="p14">
-      <p:transition spd="slow" p14:dur="2000" advTm="10893">
+      <p:transition spd="slow" p14:dur="2000" advTm="1382">
         <p14:prism isContent="1"/>
       </p:transition>
     </mc:Choice>
     <mc:Fallback xmlns="">
-      <p:transition spd="slow" advTm="10893">
+      <p:transition spd="slow" advTm="1382">
         <p:fade/>
       </p:transition>
     </mc:Fallback>
@@ -8111,12 +8113,12 @@
   </p:clrMapOvr>
   <mc:AlternateContent xmlns:mc="http://schemas.openxmlformats.org/markup-compatibility/2006" xmlns:p14="http://schemas.microsoft.com/office/powerpoint/2010/main">
     <mc:Choice Requires="p14">
-      <p:transition spd="slow" p14:dur="2000" advTm="355">
+      <p:transition spd="slow" p14:dur="2000" advTm="775">
         <p14:prism isContent="1"/>
       </p:transition>
     </mc:Choice>
     <mc:Fallback xmlns="">
-      <p:transition spd="slow" advTm="355">
+      <p:transition spd="slow" advTm="775">
         <p:fade/>
       </p:transition>
     </mc:Fallback>
@@ -9219,12 +9221,12 @@
   </p:clrMapOvr>
   <mc:AlternateContent xmlns:mc="http://schemas.openxmlformats.org/markup-compatibility/2006" xmlns:p14="http://schemas.microsoft.com/office/powerpoint/2010/main">
     <mc:Choice Requires="p14">
-      <p:transition spd="slow" p14:dur="2000" advTm="86">
+      <p:transition spd="slow" p14:dur="2000" advTm="2">
         <p14:prism isContent="1"/>
       </p:transition>
     </mc:Choice>
     <mc:Fallback xmlns="">
-      <p:transition spd="slow" advTm="86">
+      <p:transition spd="slow" advTm="2">
         <p:fade/>
       </p:transition>
     </mc:Fallback>
@@ -14694,6 +14696,168 @@
       </p:grpSpPr>
       <p:sp>
         <p:nvSpPr>
+          <p:cNvPr id="2" name="Title 1">
+            <a:extLst>
+              <a:ext uri="{FF2B5EF4-FFF2-40B4-BE49-F238E27FC236}">
+                <a16:creationId xmlns:a16="http://schemas.microsoft.com/office/drawing/2014/main" id="{12AED8DE-6039-46D8-A337-65B4A2A9FD7D}"/>
+              </a:ext>
+            </a:extLst>
+          </p:cNvPr>
+          <p:cNvSpPr>
+            <a:spLocks noGrp="1"/>
+          </p:cNvSpPr>
+          <p:nvPr>
+            <p:ph type="title"/>
+          </p:nvPr>
+        </p:nvSpPr>
+        <p:spPr/>
+        <p:txBody>
+          <a:bodyPr/>
+          <a:lstStyle/>
+          <a:p>
+            <a:r>
+              <a:rPr lang="en-US" dirty="0"/>
+              <a:t>Design Decisions </a:t>
+            </a:r>
+            <a:endParaRPr lang="en-CA" dirty="0"/>
+          </a:p>
+        </p:txBody>
+      </p:sp>
+      <p:sp>
+        <p:nvSpPr>
+          <p:cNvPr id="3" name="Content Placeholder 2">
+            <a:extLst>
+              <a:ext uri="{FF2B5EF4-FFF2-40B4-BE49-F238E27FC236}">
+                <a16:creationId xmlns:a16="http://schemas.microsoft.com/office/drawing/2014/main" id="{E683A763-45BE-4DBC-B81B-4ACA5F043004}"/>
+              </a:ext>
+            </a:extLst>
+          </p:cNvPr>
+          <p:cNvSpPr>
+            <a:spLocks noGrp="1"/>
+          </p:cNvSpPr>
+          <p:nvPr>
+            <p:ph idx="1"/>
+          </p:nvPr>
+        </p:nvSpPr>
+        <p:spPr/>
+        <p:txBody>
+          <a:bodyPr>
+            <a:normAutofit lnSpcReduction="10000"/>
+          </a:bodyPr>
+          <a:lstStyle/>
+          <a:p>
+            <a:pPr>
+              <a:buFont typeface="Wingdings" panose="05000000000000000000" pitchFamily="2" charset="2"/>
+              <a:buChar char="v"/>
+            </a:pPr>
+            <a:r>
+              <a:rPr lang="en-US" dirty="0"/>
+              <a:t>We have used text view for the email input.</a:t>
+            </a:r>
+          </a:p>
+          <a:p>
+            <a:pPr>
+              <a:buFont typeface="Wingdings" panose="05000000000000000000" pitchFamily="2" charset="2"/>
+              <a:buChar char="v"/>
+            </a:pPr>
+            <a:r>
+              <a:rPr lang="en-US" dirty="0"/>
+              <a:t>Password input field for password which does not show the password while typing. </a:t>
+            </a:r>
+          </a:p>
+          <a:p>
+            <a:pPr>
+              <a:buFont typeface="Wingdings" panose="05000000000000000000" pitchFamily="2" charset="2"/>
+              <a:buChar char="v"/>
+            </a:pPr>
+            <a:r>
+              <a:rPr lang="en-CA" dirty="0"/>
+              <a:t>Checkbox for the remember me field .</a:t>
+            </a:r>
+          </a:p>
+          <a:p>
+            <a:pPr>
+              <a:buFont typeface="Wingdings" panose="05000000000000000000" pitchFamily="2" charset="2"/>
+              <a:buChar char="v"/>
+            </a:pPr>
+            <a:r>
+              <a:rPr lang="en-CA" dirty="0"/>
+              <a:t>We placed the forgot password link just below the sign button as is in most apps to ensure ease of access. </a:t>
+            </a:r>
+          </a:p>
+          <a:p>
+            <a:pPr>
+              <a:buFont typeface="Wingdings" panose="05000000000000000000" pitchFamily="2" charset="2"/>
+              <a:buChar char="v"/>
+            </a:pPr>
+            <a:r>
+              <a:rPr lang="en-CA" dirty="0"/>
+              <a:t>The Home menu is pretty simple easy and self explanatory. </a:t>
+            </a:r>
+          </a:p>
+          <a:p>
+            <a:pPr>
+              <a:buFont typeface="Wingdings" panose="05000000000000000000" pitchFamily="2" charset="2"/>
+              <a:buChar char="v"/>
+            </a:pPr>
+            <a:r>
+              <a:rPr lang="en-CA" dirty="0"/>
+              <a:t>For all normal inputs the text view field is used and for the email there is email input field and for passwords we used the password input field. </a:t>
+            </a:r>
+          </a:p>
+          <a:p>
+            <a:pPr>
+              <a:buFont typeface="Wingdings" panose="05000000000000000000" pitchFamily="2" charset="2"/>
+              <a:buChar char="v"/>
+            </a:pPr>
+            <a:endParaRPr lang="en-CA" dirty="0"/>
+          </a:p>
+        </p:txBody>
+      </p:sp>
+    </p:spTree>
+    <p:extLst>
+      <p:ext uri="{BB962C8B-B14F-4D97-AF65-F5344CB8AC3E}">
+        <p14:creationId xmlns:p14="http://schemas.microsoft.com/office/powerpoint/2010/main" val="109061409"/>
+      </p:ext>
+    </p:extLst>
+  </p:cSld>
+  <p:clrMapOvr>
+    <a:masterClrMapping/>
+  </p:clrMapOvr>
+  <mc:AlternateContent xmlns:mc="http://schemas.openxmlformats.org/markup-compatibility/2006" xmlns:p14="http://schemas.microsoft.com/office/powerpoint/2010/main">
+    <mc:Choice Requires="p14">
+      <p:transition spd="slow" p14:dur="2000" advTm="20000">
+        <p14:prism isContent="1"/>
+      </p:transition>
+    </mc:Choice>
+    <mc:Fallback xmlns="">
+      <p:transition spd="slow" advTm="20000">
+        <p:fade/>
+      </p:transition>
+    </mc:Fallback>
+  </mc:AlternateContent>
+</p:sld>
+</file>
+
+<file path=ppt/slides/slide18.xml><?xml version="1.0" encoding="utf-8"?>
+<p:sld xmlns:a="http://schemas.openxmlformats.org/drawingml/2006/main" xmlns:r="http://schemas.openxmlformats.org/officeDocument/2006/relationships" xmlns:p="http://schemas.openxmlformats.org/presentationml/2006/main">
+  <p:cSld>
+    <p:spTree>
+      <p:nvGrpSpPr>
+        <p:cNvPr id="1" name=""/>
+        <p:cNvGrpSpPr/>
+        <p:nvPr/>
+      </p:nvGrpSpPr>
+      <p:grpSpPr>
+        <a:xfrm>
+          <a:off x="0" y="0"/>
+          <a:ext cx="0" cy="0"/>
+          <a:chOff x="0" y="0"/>
+          <a:chExt cx="0" cy="0"/>
+        </a:xfrm>
+      </p:grpSpPr>
+      <p:sp>
+        <p:nvSpPr>
           <p:cNvPr id="2" name="Title 1"/>
           <p:cNvSpPr>
             <a:spLocks noGrp="1"/>
@@ -14791,6 +14955,153 @@
         </p:txBody>
       </p:sp>
     </p:spTree>
+  </p:cSld>
+  <p:clrMapOvr>
+    <a:masterClrMapping/>
+  </p:clrMapOvr>
+  <mc:AlternateContent xmlns:mc="http://schemas.openxmlformats.org/markup-compatibility/2006" xmlns:p14="http://schemas.microsoft.com/office/powerpoint/2010/main">
+    <mc:Choice Requires="p14">
+      <p:transition spd="slow" p14:dur="2000" advTm="20000">
+        <p14:prism isContent="1"/>
+      </p:transition>
+    </mc:Choice>
+    <mc:Fallback xmlns="">
+      <p:transition spd="slow" advTm="20000">
+        <p:fade/>
+      </p:transition>
+    </mc:Fallback>
+  </mc:AlternateContent>
+</p:sld>
+</file>
+
+<file path=ppt/slides/slide19.xml><?xml version="1.0" encoding="utf-8"?>
+<p:sld xmlns:a="http://schemas.openxmlformats.org/drawingml/2006/main" xmlns:r="http://schemas.openxmlformats.org/officeDocument/2006/relationships" xmlns:p="http://schemas.openxmlformats.org/presentationml/2006/main">
+  <p:cSld>
+    <p:spTree>
+      <p:nvGrpSpPr>
+        <p:cNvPr id="1" name=""/>
+        <p:cNvGrpSpPr/>
+        <p:nvPr/>
+      </p:nvGrpSpPr>
+      <p:grpSpPr>
+        <a:xfrm>
+          <a:off x="0" y="0"/>
+          <a:ext cx="0" cy="0"/>
+          <a:chOff x="0" y="0"/>
+          <a:chExt cx="0" cy="0"/>
+        </a:xfrm>
+      </p:grpSpPr>
+      <p:sp>
+        <p:nvSpPr>
+          <p:cNvPr id="2" name="Title 1">
+            <a:extLst>
+              <a:ext uri="{FF2B5EF4-FFF2-40B4-BE49-F238E27FC236}">
+                <a16:creationId xmlns:a16="http://schemas.microsoft.com/office/drawing/2014/main" id="{A0DBE5BB-1D90-42C4-8F18-4CDB6F3A08C3}"/>
+              </a:ext>
+            </a:extLst>
+          </p:cNvPr>
+          <p:cNvSpPr>
+            <a:spLocks noGrp="1"/>
+          </p:cNvSpPr>
+          <p:nvPr>
+            <p:ph type="title"/>
+          </p:nvPr>
+        </p:nvSpPr>
+        <p:spPr/>
+        <p:txBody>
+          <a:bodyPr/>
+          <a:lstStyle/>
+          <a:p>
+            <a:r>
+              <a:rPr lang="en-US" dirty="0"/>
+              <a:t>Submitted by :</a:t>
+            </a:r>
+            <a:endParaRPr lang="en-CA" dirty="0"/>
+          </a:p>
+        </p:txBody>
+      </p:sp>
+      <p:sp>
+        <p:nvSpPr>
+          <p:cNvPr id="3" name="Content Placeholder 2">
+            <a:extLst>
+              <a:ext uri="{FF2B5EF4-FFF2-40B4-BE49-F238E27FC236}">
+                <a16:creationId xmlns:a16="http://schemas.microsoft.com/office/drawing/2014/main" id="{B45B0547-A064-4220-90F7-ABFC17D83406}"/>
+              </a:ext>
+            </a:extLst>
+          </p:cNvPr>
+          <p:cNvSpPr>
+            <a:spLocks noGrp="1"/>
+          </p:cNvSpPr>
+          <p:nvPr>
+            <p:ph idx="1"/>
+          </p:nvPr>
+        </p:nvSpPr>
+        <p:spPr/>
+        <p:txBody>
+          <a:bodyPr/>
+          <a:lstStyle/>
+          <a:p>
+            <a:pPr marL="0" indent="0">
+              <a:buNone/>
+            </a:pPr>
+            <a:r>
+              <a:rPr lang="en-US" dirty="0"/>
+              <a:t>Sandeep Singh (1896201)</a:t>
+            </a:r>
+          </a:p>
+          <a:p>
+            <a:pPr marL="0" indent="0">
+              <a:buNone/>
+            </a:pPr>
+            <a:r>
+              <a:rPr lang="en-US" dirty="0"/>
+              <a:t>Avtar Singh(1896909)</a:t>
+            </a:r>
+          </a:p>
+          <a:p>
+            <a:pPr marL="0" indent="0">
+              <a:buNone/>
+            </a:pPr>
+            <a:r>
+              <a:rPr lang="en-US" dirty="0"/>
+              <a:t>Jatinder Singh Mann(1896568)</a:t>
+            </a:r>
+          </a:p>
+          <a:p>
+            <a:pPr marL="0" indent="0">
+              <a:buNone/>
+            </a:pPr>
+            <a:r>
+              <a:rPr lang="en-US" dirty="0"/>
+              <a:t>Jaskaran Singh (1898348)</a:t>
+            </a:r>
+          </a:p>
+          <a:p>
+            <a:pPr marL="0" indent="0">
+              <a:buNone/>
+            </a:pPr>
+            <a:r>
+              <a:rPr lang="en-US" dirty="0"/>
+              <a:t>Sahil </a:t>
+            </a:r>
+            <a:r>
+              <a:rPr lang="en-US" dirty="0" err="1"/>
+              <a:t>Rangra</a:t>
+            </a:r>
+            <a:r>
+              <a:rPr lang="en-US" dirty="0"/>
+              <a:t> (1896322)</a:t>
+            </a:r>
+            <a:endParaRPr lang="en-CA" dirty="0"/>
+          </a:p>
+        </p:txBody>
+      </p:sp>
+    </p:spTree>
+    <p:extLst>
+      <p:ext uri="{BB962C8B-B14F-4D97-AF65-F5344CB8AC3E}">
+        <p14:creationId xmlns:p14="http://schemas.microsoft.com/office/powerpoint/2010/main" val="4202975633"/>
+      </p:ext>
+    </p:extLst>
   </p:cSld>
   <p:clrMapOvr>
     <a:masterClrMapping/>
@@ -14928,12 +15239,12 @@
   </p:clrMapOvr>
   <mc:AlternateContent xmlns:mc="http://schemas.openxmlformats.org/markup-compatibility/2006" xmlns:p14="http://schemas.microsoft.com/office/powerpoint/2010/main">
     <mc:Choice Requires="p14">
-      <p:transition spd="slow" p14:dur="2000" advTm="20000">
+      <p:transition spd="slow" p14:dur="2000" advTm="260">
         <p14:prism isContent="1"/>
       </p:transition>
     </mc:Choice>
     <mc:Fallback xmlns="">
-      <p:transition spd="slow" advTm="20000">
+      <p:transition spd="slow" advTm="260">
         <p:fade/>
       </p:transition>
     </mc:Fallback>
@@ -15083,12 +15394,12 @@
   </p:clrMapOvr>
   <mc:AlternateContent xmlns:mc="http://schemas.openxmlformats.org/markup-compatibility/2006" xmlns:p14="http://schemas.microsoft.com/office/powerpoint/2010/main">
     <mc:Choice Requires="p14">
-      <p:transition spd="slow" p14:dur="2000" advTm="20000">
+      <p:transition spd="slow" p14:dur="2000" advTm="208">
         <p14:prism isContent="1"/>
       </p:transition>
     </mc:Choice>
     <mc:Fallback xmlns="">
-      <p:transition spd="slow" advTm="20000">
+      <p:transition spd="slow" advTm="208">
         <p:fade/>
       </p:transition>
     </mc:Fallback>
@@ -15311,12 +15622,12 @@
   </p:clrMapOvr>
   <mc:AlternateContent xmlns:mc="http://schemas.openxmlformats.org/markup-compatibility/2006" xmlns:p14="http://schemas.microsoft.com/office/powerpoint/2010/main">
     <mc:Choice Requires="p14">
-      <p:transition spd="slow" p14:dur="2000" advTm="20000">
+      <p:transition spd="slow" p14:dur="2000" advTm="93">
         <p14:prism isContent="1"/>
       </p:transition>
     </mc:Choice>
     <mc:Fallback xmlns="">
-      <p:transition spd="slow" advTm="20000">
+      <p:transition spd="slow" advTm="93">
         <p:fade/>
       </p:transition>
     </mc:Fallback>
@@ -16433,12 +16744,12 @@
   </p:clrMapOvr>
   <mc:AlternateContent xmlns:mc="http://schemas.openxmlformats.org/markup-compatibility/2006" xmlns:p14="http://schemas.microsoft.com/office/powerpoint/2010/main">
     <mc:Choice Requires="p14">
-      <p:transition spd="slow" p14:dur="2000" advTm="1215">
+      <p:transition spd="slow" p14:dur="2000" advTm="2508">
         <p14:prism isContent="1"/>
       </p:transition>
     </mc:Choice>
     <mc:Fallback xmlns="">
-      <p:transition spd="slow" advTm="1215">
+      <p:transition spd="slow" advTm="2508">
         <p:fade/>
       </p:transition>
     </mc:Fallback>
@@ -17536,12 +17847,12 @@
   </p:clrMapOvr>
   <mc:AlternateContent xmlns:mc="http://schemas.openxmlformats.org/markup-compatibility/2006" xmlns:p14="http://schemas.microsoft.com/office/powerpoint/2010/main">
     <mc:Choice Requires="p14">
-      <p:transition spd="slow" p14:dur="2000" advTm="628">
+      <p:transition spd="slow" p14:dur="2000" advTm="7694">
         <p14:prism isContent="1"/>
       </p:transition>
     </mc:Choice>
     <mc:Fallback xmlns="">
-      <p:transition spd="slow" advTm="628">
+      <p:transition spd="slow" advTm="7694">
         <p:fade/>
       </p:transition>
     </mc:Fallback>
@@ -18632,12 +18943,12 @@
   </p:clrMapOvr>
   <mc:AlternateContent xmlns:mc="http://schemas.openxmlformats.org/markup-compatibility/2006" xmlns:p14="http://schemas.microsoft.com/office/powerpoint/2010/main">
     <mc:Choice Requires="p14">
-      <p:transition spd="slow" p14:dur="2000" advTm="251">
+      <p:transition spd="slow" p14:dur="2000" advTm="934">
         <p14:prism isContent="1"/>
       </p:transition>
     </mc:Choice>
     <mc:Fallback xmlns="">
-      <p:transition spd="slow" advTm="251">
+      <p:transition spd="slow" advTm="934">
         <p:fade/>
       </p:transition>
     </mc:Fallback>
@@ -19734,12 +20045,12 @@
   </p:clrMapOvr>
   <mc:AlternateContent xmlns:mc="http://schemas.openxmlformats.org/markup-compatibility/2006" xmlns:p14="http://schemas.microsoft.com/office/powerpoint/2010/main">
     <mc:Choice Requires="p14">
-      <p:transition spd="slow" p14:dur="2000" advTm="258">
+      <p:transition spd="slow" p14:dur="2000" advTm="419">
         <p14:prism isContent="1"/>
       </p:transition>
     </mc:Choice>
     <mc:Fallback xmlns="">
-      <p:transition spd="slow" advTm="258">
+      <p:transition spd="slow" advTm="419">
         <p:fade/>
       </p:transition>
     </mc:Fallback>
@@ -20841,12 +21152,12 @@
   </p:clrMapOvr>
   <mc:AlternateContent xmlns:mc="http://schemas.openxmlformats.org/markup-compatibility/2006" xmlns:p14="http://schemas.microsoft.com/office/powerpoint/2010/main">
     <mc:Choice Requires="p14">
-      <p:transition spd="slow" p14:dur="2000" advTm="166">
+      <p:transition spd="slow" p14:dur="2000" advTm="7">
         <p14:prism isContent="1"/>
       </p:transition>
     </mc:Choice>
     <mc:Fallback xmlns="">
-      <p:transition spd="slow" advTm="166">
+      <p:transition spd="slow" advTm="7">
         <p:fade/>
       </p:transition>
     </mc:Fallback>

</xml_diff>